<commit_message>
More slides and brainstorming
</commit_message>
<xml_diff>
--- a/Slides.pptx
+++ b/Slides.pptx
@@ -5,22 +5,20 @@
     <p:sldMasterId id="2147483660" r:id="rId1"/>
   </p:sldMasterIdLst>
   <p:notesMasterIdLst>
-    <p:notesMasterId r:id="rId15"/>
+    <p:notesMasterId r:id="rId13"/>
   </p:notesMasterIdLst>
   <p:sldIdLst>
     <p:sldId id="256" r:id="rId2"/>
     <p:sldId id="257" r:id="rId3"/>
     <p:sldId id="258" r:id="rId4"/>
     <p:sldId id="259" r:id="rId5"/>
-    <p:sldId id="260" r:id="rId6"/>
-    <p:sldId id="261" r:id="rId7"/>
-    <p:sldId id="262" r:id="rId8"/>
-    <p:sldId id="263" r:id="rId9"/>
-    <p:sldId id="264" r:id="rId10"/>
-    <p:sldId id="265" r:id="rId11"/>
-    <p:sldId id="266" r:id="rId12"/>
-    <p:sldId id="267" r:id="rId13"/>
-    <p:sldId id="268" r:id="rId14"/>
+    <p:sldId id="261" r:id="rId6"/>
+    <p:sldId id="262" r:id="rId7"/>
+    <p:sldId id="260" r:id="rId8"/>
+    <p:sldId id="264" r:id="rId9"/>
+    <p:sldId id="265" r:id="rId10"/>
+    <p:sldId id="267" r:id="rId11"/>
+    <p:sldId id="268" r:id="rId12"/>
   </p:sldIdLst>
   <p:sldSz cx="12192000" cy="6858000"/>
   <p:notesSz cx="6858000" cy="9144000"/>
@@ -119,6 +117,11 @@
       </a:defRPr>
     </a:lvl9pPr>
   </p:defaultTextStyle>
+  <p:extLst>
+    <p:ext uri="{EFAFB233-063F-42B5-8137-9DF3F51BA10A}">
+      <p15:sldGuideLst xmlns:p15="http://schemas.microsoft.com/office/powerpoint/2012/main"/>
+    </p:ext>
+  </p:extLst>
 </p:presentation>
 </file>
 
@@ -204,7 +207,7 @@
           <a:p>
             <a:fld id="{B928FECA-C38F-488B-88C2-5B9E8575527C}" type="datetimeFigureOut">
               <a:rPr lang="en-AU" smtClean="0"/>
-              <a:t>21/03/2022</a:t>
+              <a:t>22/03/2022</a:t>
             </a:fld>
             <a:endParaRPr lang="en-AU"/>
           </a:p>
@@ -530,6 +533,15 @@
               <a:t>Who am I?</a:t>
             </a:r>
           </a:p>
+          <a:p>
+            <a:endParaRPr lang="en-AU" dirty="0"/>
+          </a:p>
+          <a:p>
+            <a:r>
+              <a:rPr lang="en-AU" dirty="0"/>
+              <a:t>Here to talk about design techniques in modern Python</a:t>
+            </a:r>
+          </a:p>
         </p:txBody>
       </p:sp>
       <p:sp>
@@ -559,6 +571,120 @@
     <p:extLst>
       <p:ext uri="{BB962C8B-B14F-4D97-AF65-F5344CB8AC3E}">
         <p14:creationId xmlns:p14="http://schemas.microsoft.com/office/powerpoint/2010/main" val="2682691951"/>
+      </p:ext>
+    </p:extLst>
+  </p:cSld>
+  <p:clrMapOvr>
+    <a:masterClrMapping/>
+  </p:clrMapOvr>
+</p:notes>
+</file>
+
+<file path=ppt/notesSlides/notesSlide10.xml><?xml version="1.0" encoding="utf-8"?>
+<p:notes xmlns:a="http://schemas.openxmlformats.org/drawingml/2006/main" xmlns:r="http://schemas.openxmlformats.org/officeDocument/2006/relationships" xmlns:p="http://schemas.openxmlformats.org/presentationml/2006/main">
+  <p:cSld>
+    <p:spTree>
+      <p:nvGrpSpPr>
+        <p:cNvPr id="1" name=""/>
+        <p:cNvGrpSpPr/>
+        <p:nvPr/>
+      </p:nvGrpSpPr>
+      <p:grpSpPr>
+        <a:xfrm>
+          <a:off x="0" y="0"/>
+          <a:ext cx="0" cy="0"/>
+          <a:chOff x="0" y="0"/>
+          <a:chExt cx="0" cy="0"/>
+        </a:xfrm>
+      </p:grpSpPr>
+      <p:sp>
+        <p:nvSpPr>
+          <p:cNvPr id="2" name="Slide Image Placeholder 1"/>
+          <p:cNvSpPr>
+            <a:spLocks noGrp="1" noRot="1" noChangeAspect="1"/>
+          </p:cNvSpPr>
+          <p:nvPr>
+            <p:ph type="sldImg"/>
+          </p:nvPr>
+        </p:nvSpPr>
+        <p:spPr/>
+      </p:sp>
+      <p:sp>
+        <p:nvSpPr>
+          <p:cNvPr id="3" name="Notes Placeholder 2"/>
+          <p:cNvSpPr>
+            <a:spLocks noGrp="1"/>
+          </p:cNvSpPr>
+          <p:nvPr>
+            <p:ph type="body" idx="1"/>
+          </p:nvPr>
+        </p:nvSpPr>
+        <p:spPr/>
+        <p:txBody>
+          <a:bodyPr/>
+          <a:lstStyle/>
+          <a:p>
+            <a:r>
+              <a:rPr lang="en-AU" dirty="0"/>
+              <a:t>Python pattern matching not quite powerful enough.</a:t>
+            </a:r>
+          </a:p>
+          <a:p>
+            <a:endParaRPr lang="en-AU" dirty="0"/>
+          </a:p>
+          <a:p>
+            <a:r>
+              <a:rPr lang="en-AU" dirty="0"/>
+              <a:t>Tooling has some issues.</a:t>
+            </a:r>
+          </a:p>
+          <a:p>
+            <a:endParaRPr lang="en-AU" dirty="0"/>
+          </a:p>
+          <a:p>
+            <a:r>
+              <a:rPr lang="en-AU" dirty="0"/>
+              <a:t>Need Elixir’s with for concise control flow.</a:t>
+            </a:r>
+          </a:p>
+          <a:p>
+            <a:endParaRPr lang="en-AU" dirty="0"/>
+          </a:p>
+          <a:p>
+            <a:r>
+              <a:rPr lang="en-AU" dirty="0"/>
+              <a:t>Maybe better support will come in the future?</a:t>
+            </a:r>
+          </a:p>
+        </p:txBody>
+      </p:sp>
+      <p:sp>
+        <p:nvSpPr>
+          <p:cNvPr id="4" name="Slide Number Placeholder 3"/>
+          <p:cNvSpPr>
+            <a:spLocks noGrp="1"/>
+          </p:cNvSpPr>
+          <p:nvPr>
+            <p:ph type="sldNum" sz="quarter" idx="5"/>
+          </p:nvPr>
+        </p:nvSpPr>
+        <p:spPr/>
+        <p:txBody>
+          <a:bodyPr/>
+          <a:lstStyle/>
+          <a:p>
+            <a:fld id="{0A34E8C3-AF3B-4DB6-BCDD-863FC76CE8C1}" type="slidenum">
+              <a:rPr lang="en-AU" smtClean="0"/>
+              <a:t>11</a:t>
+            </a:fld>
+            <a:endParaRPr lang="en-AU"/>
+          </a:p>
+        </p:txBody>
+      </p:sp>
+    </p:spTree>
+    <p:extLst>
+      <p:ext uri="{BB962C8B-B14F-4D97-AF65-F5344CB8AC3E}">
+        <p14:creationId xmlns:p14="http://schemas.microsoft.com/office/powerpoint/2010/main" val="1578235702"/>
       </p:ext>
     </p:extLst>
   </p:cSld>
@@ -641,7 +767,7 @@
           <a:p>
             <a:r>
               <a:rPr lang="en-AU" dirty="0"/>
-              <a:t>Here to describe and inspire, not prescribe usage.</a:t>
+              <a:t>Hope to inspire ideas, not prescribe usage.</a:t>
             </a:r>
           </a:p>
           <a:p>
@@ -650,13 +776,8 @@
           <a:p>
             <a:r>
               <a:rPr lang="en-AU" dirty="0"/>
-              <a:t>Ask </a:t>
-            </a:r>
-            <a:r>
-              <a:rPr lang="en-AU"/>
-              <a:t>any questions.</a:t>
-            </a:r>
-            <a:endParaRPr lang="en-AU" dirty="0"/>
+              <a:t>Ask any questions – not going into tonnes of detail.</a:t>
+            </a:r>
           </a:p>
         </p:txBody>
       </p:sp>
@@ -742,7 +863,7 @@
           <a:p>
             <a:r>
               <a:rPr lang="en-AU" dirty="0"/>
-              <a:t>Ask if need to go over type hints?</a:t>
+              <a:t>Type hints core to a lot of this presentation.</a:t>
             </a:r>
           </a:p>
           <a:p>
@@ -751,7 +872,7 @@
           <a:p>
             <a:r>
               <a:rPr lang="en-AU" dirty="0"/>
-              <a:t>Type hints core to a lot of this presentation.</a:t>
+              <a:t>Type hints are Python’s static typing.</a:t>
             </a:r>
           </a:p>
           <a:p>
@@ -760,7 +881,7 @@
           <a:p>
             <a:r>
               <a:rPr lang="en-AU" dirty="0"/>
-              <a:t>Static typing is present in many languages.</a:t>
+              <a:t>Static analysis helps make safer code with fewer bugs.</a:t>
             </a:r>
           </a:p>
           <a:p>
@@ -769,16 +890,7 @@
           <a:p>
             <a:r>
               <a:rPr lang="en-AU" dirty="0"/>
-              <a:t>Static analysis helps make safer code with fewer bugs.</a:t>
-            </a:r>
-          </a:p>
-          <a:p>
-            <a:endParaRPr lang="en-AU" dirty="0"/>
-          </a:p>
-          <a:p>
-            <a:r>
-              <a:rPr lang="en-AU" dirty="0"/>
-              <a:t>Also better readability. Ever seen unreadable Python code?</a:t>
+              <a:t>Also better readability.</a:t>
             </a:r>
           </a:p>
         </p:txBody>
@@ -865,7 +977,7 @@
           <a:p>
             <a:r>
               <a:rPr lang="en-AU" dirty="0"/>
-              <a:t>But Python is dynamically typed scripting language.</a:t>
+              <a:t>Few new features you may not have seen.</a:t>
             </a:r>
           </a:p>
           <a:p>
@@ -874,7 +986,7 @@
           <a:p>
             <a:r>
               <a:rPr lang="en-AU" dirty="0"/>
-              <a:t>Add type hints for static analysis.</a:t>
+              <a:t>Generics for built in collections.</a:t>
             </a:r>
           </a:p>
           <a:p>
@@ -883,17 +995,14 @@
           <a:p>
             <a:r>
               <a:rPr lang="en-AU" dirty="0"/>
-              <a:t>Type hints are not used at runtime.</a:t>
+              <a:t>Union special form to pipe operator, Python 3.10</a:t>
             </a:r>
           </a:p>
           <a:p>
             <a:endParaRPr lang="en-AU" dirty="0"/>
           </a:p>
           <a:p>
-            <a:r>
-              <a:rPr lang="en-AU" dirty="0"/>
-              <a:t>Basic code example – brief, probably already seen type hints and will discuss more later.</a:t>
-            </a:r>
+            <a:endParaRPr lang="en-AU" dirty="0"/>
           </a:p>
         </p:txBody>
       </p:sp>
@@ -979,7 +1088,14 @@
           <a:p>
             <a:r>
               <a:rPr lang="en-AU" dirty="0"/>
-              <a:t>Another basic tool that’s not new, but very useful.</a:t>
+              <a:t>Feature of type hinting for parameterising things on types.</a:t>
+            </a:r>
+            <a:br>
+              <a:rPr lang="en-AU" dirty="0"/>
+            </a:br>
+            <a:r>
+              <a:rPr lang="en-AU" dirty="0"/>
+              <a:t>I think it’s underused in Python.</a:t>
             </a:r>
           </a:p>
           <a:p>
@@ -988,7 +1104,7 @@
           <a:p>
             <a:r>
               <a:rPr lang="en-AU" dirty="0"/>
-              <a:t>Also known as struct, record, POD types – class with just data.</a:t>
+              <a:t>Java and C# generics, C++ templates.</a:t>
             </a:r>
           </a:p>
           <a:p>
@@ -997,14 +1113,7 @@
           <a:p>
             <a:r>
               <a:rPr lang="en-AU" dirty="0"/>
-              <a:t>Found in many functional languages, also C, C#, Kotlin.</a:t>
-            </a:r>
-            <a:br>
-              <a:rPr lang="en-AU" dirty="0"/>
-            </a:br>
-            <a:r>
-              <a:rPr lang="en-AU" dirty="0"/>
-              <a:t>Kotlin in particular is good.</a:t>
+              <a:t>Python already does polymorphism, but this adds static analysis.</a:t>
             </a:r>
           </a:p>
           <a:p>
@@ -1012,53 +1121,18 @@
           </a:p>
           <a:p>
             <a:r>
-              <a:rPr lang="en-AU" dirty="0"/>
-              <a:t>Find myself often writing functional Python code.</a:t>
-            </a:r>
-            <a:br>
-              <a:rPr lang="en-AU" dirty="0"/>
-            </a:br>
-            <a:r>
-              <a:rPr lang="en-AU" dirty="0"/>
-              <a:t>Often classes with just data, constructor sets </a:t>
-            </a:r>
-            <a:r>
               <a:rPr lang="en-AU" dirty="0" err="1"/>
-              <a:t>args</a:t>
-            </a:r>
-            <a:r>
-              <a:rPr lang="en-AU" dirty="0"/>
-              <a:t> to fields.</a:t>
-            </a:r>
-          </a:p>
-          <a:p>
-            <a:r>
-              <a:rPr lang="en-AU" dirty="0"/>
-              <a:t>Don’t need mutability nor OO complexity.</a:t>
-            </a:r>
-          </a:p>
-          <a:p>
-            <a:endParaRPr lang="en-AU" dirty="0"/>
-          </a:p>
-          <a:p>
-            <a:r>
-              <a:rPr lang="en-AU" dirty="0"/>
-              <a:t>Immutability yields safer code.</a:t>
-            </a:r>
-          </a:p>
-          <a:p>
-            <a:endParaRPr lang="en-AU" dirty="0"/>
-          </a:p>
-          <a:p>
-            <a:r>
-              <a:rPr lang="en-AU" dirty="0"/>
-              <a:t>Filesystem example code.</a:t>
-            </a:r>
-          </a:p>
-          <a:p>
-            <a:r>
-              <a:rPr lang="en-AU" dirty="0"/>
-              <a:t>Address example code.</a:t>
+              <a:t>Rotate_array</a:t>
+            </a:r>
+            <a:r>
+              <a:rPr lang="en-AU" dirty="0"/>
+              <a:t> code example.</a:t>
+            </a:r>
+          </a:p>
+          <a:p>
+            <a:r>
+              <a:rPr lang="en-AU" dirty="0"/>
+              <a:t>Stack code example.</a:t>
             </a:r>
           </a:p>
         </p:txBody>
@@ -1089,7 +1163,7 @@
     </p:spTree>
     <p:extLst>
       <p:ext uri="{BB962C8B-B14F-4D97-AF65-F5344CB8AC3E}">
-        <p14:creationId xmlns:p14="http://schemas.microsoft.com/office/powerpoint/2010/main" val="4202269004"/>
+        <p14:creationId xmlns:p14="http://schemas.microsoft.com/office/powerpoint/2010/main" val="156946529"/>
       </p:ext>
     </p:extLst>
   </p:cSld>
@@ -1145,7 +1219,7 @@
           <a:p>
             <a:r>
               <a:rPr lang="en-AU" dirty="0"/>
-              <a:t>Feature of type hinting for parameterising things on types.</a:t>
+              <a:t>Another basic tool that’s not new, but very useful.</a:t>
             </a:r>
           </a:p>
           <a:p>
@@ -1154,7 +1228,7 @@
           <a:p>
             <a:r>
               <a:rPr lang="en-AU" dirty="0"/>
-              <a:t>Java and C# generics, C++ templates.</a:t>
+              <a:t>Also known as struct, record, POD types – class with just data.</a:t>
             </a:r>
           </a:p>
           <a:p>
@@ -1163,7 +1237,14 @@
           <a:p>
             <a:r>
               <a:rPr lang="en-AU" dirty="0"/>
-              <a:t>Importantly, type safe.</a:t>
+              <a:t>Found in many functional languages, also C, C#, Kotlin.</a:t>
+            </a:r>
+            <a:br>
+              <a:rPr lang="en-AU" dirty="0"/>
+            </a:br>
+            <a:r>
+              <a:rPr lang="en-AU" dirty="0"/>
+              <a:t>Kotlin in particular is good.</a:t>
             </a:r>
           </a:p>
           <a:p>
@@ -1171,18 +1252,62 @@
           </a:p>
           <a:p>
             <a:r>
+              <a:rPr lang="en-AU" dirty="0"/>
+              <a:t>Find myself often writing functional Python code.</a:t>
+            </a:r>
+            <a:br>
+              <a:rPr lang="en-AU" dirty="0"/>
+            </a:br>
+            <a:r>
+              <a:rPr lang="en-AU" dirty="0"/>
+              <a:t>Often classes with just data, constructor sets </a:t>
+            </a:r>
+            <a:r>
               <a:rPr lang="en-AU" dirty="0" err="1"/>
-              <a:t>Rotate_array</a:t>
-            </a:r>
-            <a:r>
-              <a:rPr lang="en-AU" dirty="0"/>
-              <a:t> code example.</a:t>
-            </a:r>
-          </a:p>
-          <a:p>
-            <a:r>
-              <a:rPr lang="en-AU" dirty="0"/>
-              <a:t>Stack code example.</a:t>
+              <a:t>args</a:t>
+            </a:r>
+            <a:r>
+              <a:rPr lang="en-AU" dirty="0"/>
+              <a:t> to fields.</a:t>
+            </a:r>
+          </a:p>
+          <a:p>
+            <a:r>
+              <a:rPr lang="en-AU" dirty="0"/>
+              <a:t>Don’t need mutability nor OO complexity.</a:t>
+            </a:r>
+          </a:p>
+          <a:p>
+            <a:endParaRPr lang="en-AU" dirty="0"/>
+          </a:p>
+          <a:p>
+            <a:r>
+              <a:rPr lang="en-AU" dirty="0"/>
+              <a:t>Immutability yields safer code.</a:t>
+            </a:r>
+          </a:p>
+          <a:p>
+            <a:endParaRPr lang="en-AU" dirty="0"/>
+          </a:p>
+          <a:p>
+            <a:r>
+              <a:rPr lang="en-AU" dirty="0"/>
+              <a:t>Simplify code.</a:t>
+            </a:r>
+          </a:p>
+          <a:p>
+            <a:endParaRPr lang="en-AU" dirty="0"/>
+          </a:p>
+          <a:p>
+            <a:r>
+              <a:rPr lang="en-AU" dirty="0"/>
+              <a:t>Filesystem example code.</a:t>
+            </a:r>
+          </a:p>
+          <a:p>
+            <a:r>
+              <a:rPr lang="en-AU" dirty="0"/>
+              <a:t>Address example code.</a:t>
             </a:r>
           </a:p>
         </p:txBody>
@@ -1204,7 +1329,7 @@
           <a:p>
             <a:fld id="{0A34E8C3-AF3B-4DB6-BCDD-863FC76CE8C1}" type="slidenum">
               <a:rPr lang="en-AU" smtClean="0"/>
-              <a:t>6</a:t>
+              <a:t>7</a:t>
             </a:fld>
             <a:endParaRPr lang="en-AU"/>
           </a:p>
@@ -1213,7 +1338,7 @@
     </p:spTree>
     <p:extLst>
       <p:ext uri="{BB962C8B-B14F-4D97-AF65-F5344CB8AC3E}">
-        <p14:creationId xmlns:p14="http://schemas.microsoft.com/office/powerpoint/2010/main" val="156946529"/>
+        <p14:creationId xmlns:p14="http://schemas.microsoft.com/office/powerpoint/2010/main" val="4202269004"/>
       </p:ext>
     </p:extLst>
   </p:cSld>
@@ -1269,7 +1394,7 @@
           <a:p>
             <a:r>
               <a:rPr lang="en-AU" dirty="0"/>
-              <a:t>Very cool feature I call deduced self type.</a:t>
+              <a:t>Very cool technique I call deduced self type.</a:t>
             </a:r>
           </a:p>
           <a:p>
@@ -1321,7 +1446,7 @@
             </a:r>
             <a:r>
               <a:rPr lang="en-AU" dirty="0"/>
-              <a:t>.</a:t>
+              <a:t> with static analysis.</a:t>
             </a:r>
           </a:p>
           <a:p>
@@ -1330,7 +1455,94 @@
           <a:p>
             <a:r>
               <a:rPr lang="en-AU" dirty="0"/>
-              <a:t>Allows type safe code.</a:t>
+              <a:t>Printer code example.</a:t>
+            </a:r>
+          </a:p>
+        </p:txBody>
+      </p:sp>
+      <p:sp>
+        <p:nvSpPr>
+          <p:cNvPr id="4" name="Slide Number Placeholder 3"/>
+          <p:cNvSpPr>
+            <a:spLocks noGrp="1"/>
+          </p:cNvSpPr>
+          <p:nvPr>
+            <p:ph type="sldNum" sz="quarter" idx="5"/>
+          </p:nvPr>
+        </p:nvSpPr>
+        <p:spPr/>
+        <p:txBody>
+          <a:bodyPr/>
+          <a:lstStyle/>
+          <a:p>
+            <a:fld id="{0A34E8C3-AF3B-4DB6-BCDD-863FC76CE8C1}" type="slidenum">
+              <a:rPr lang="en-AU" smtClean="0"/>
+              <a:t>8</a:t>
+            </a:fld>
+            <a:endParaRPr lang="en-AU"/>
+          </a:p>
+        </p:txBody>
+      </p:sp>
+    </p:spTree>
+    <p:extLst>
+      <p:ext uri="{BB962C8B-B14F-4D97-AF65-F5344CB8AC3E}">
+        <p14:creationId xmlns:p14="http://schemas.microsoft.com/office/powerpoint/2010/main" val="2584460063"/>
+      </p:ext>
+    </p:extLst>
+  </p:cSld>
+  <p:clrMapOvr>
+    <a:masterClrMapping/>
+  </p:clrMapOvr>
+</p:notes>
+</file>
+
+<file path=ppt/notesSlides/notesSlide8.xml><?xml version="1.0" encoding="utf-8"?>
+<p:notes xmlns:a="http://schemas.openxmlformats.org/drawingml/2006/main" xmlns:r="http://schemas.openxmlformats.org/officeDocument/2006/relationships" xmlns:p="http://schemas.openxmlformats.org/presentationml/2006/main">
+  <p:cSld>
+    <p:spTree>
+      <p:nvGrpSpPr>
+        <p:cNvPr id="1" name=""/>
+        <p:cNvGrpSpPr/>
+        <p:nvPr/>
+      </p:nvGrpSpPr>
+      <p:grpSpPr>
+        <a:xfrm>
+          <a:off x="0" y="0"/>
+          <a:ext cx="0" cy="0"/>
+          <a:chOff x="0" y="0"/>
+          <a:chExt cx="0" cy="0"/>
+        </a:xfrm>
+      </p:grpSpPr>
+      <p:sp>
+        <p:nvSpPr>
+          <p:cNvPr id="2" name="Slide Image Placeholder 1"/>
+          <p:cNvSpPr>
+            <a:spLocks noGrp="1" noRot="1" noChangeAspect="1"/>
+          </p:cNvSpPr>
+          <p:nvPr>
+            <p:ph type="sldImg"/>
+          </p:nvPr>
+        </p:nvSpPr>
+        <p:spPr/>
+      </p:sp>
+      <p:sp>
+        <p:nvSpPr>
+          <p:cNvPr id="3" name="Notes Placeholder 2"/>
+          <p:cNvSpPr>
+            <a:spLocks noGrp="1"/>
+          </p:cNvSpPr>
+          <p:nvPr>
+            <p:ph type="body" idx="1"/>
+          </p:nvPr>
+        </p:nvSpPr>
+        <p:spPr/>
+        <p:txBody>
+          <a:bodyPr/>
+          <a:lstStyle/>
+          <a:p>
+            <a:r>
+              <a:rPr lang="en-AU" dirty="0"/>
+              <a:t>New feature in Python 3.8.</a:t>
             </a:r>
           </a:p>
           <a:p>
@@ -1339,7 +1551,48 @@
           <a:p>
             <a:r>
               <a:rPr lang="en-AU" dirty="0"/>
-              <a:t>Printer code example.</a:t>
+              <a:t>Adds structural subtyping like </a:t>
+            </a:r>
+            <a:r>
+              <a:rPr lang="en-AU" dirty="0" err="1"/>
+              <a:t>OCaml</a:t>
+            </a:r>
+            <a:r>
+              <a:rPr lang="en-AU" dirty="0"/>
+              <a:t>, Go, C++.</a:t>
+            </a:r>
+          </a:p>
+          <a:p>
+            <a:endParaRPr lang="en-AU" dirty="0"/>
+          </a:p>
+          <a:p>
+            <a:r>
+              <a:rPr lang="en-AU" dirty="0"/>
+              <a:t>Ad-hoc interface implementation.</a:t>
+            </a:r>
+          </a:p>
+          <a:p>
+            <a:endParaRPr lang="en-AU" dirty="0"/>
+          </a:p>
+          <a:p>
+            <a:r>
+              <a:rPr lang="en-AU" dirty="0"/>
+              <a:t>Already used a lot in Python standard library collections.</a:t>
+            </a:r>
+          </a:p>
+          <a:p>
+            <a:endParaRPr lang="en-AU" dirty="0"/>
+          </a:p>
+          <a:p>
+            <a:r>
+              <a:rPr lang="en-AU" dirty="0"/>
+              <a:t>Simplifies code for commonly-used interfaces.</a:t>
+            </a:r>
+          </a:p>
+          <a:p>
+            <a:r>
+              <a:rPr lang="en-AU" dirty="0"/>
+              <a:t>Statically analysable.</a:t>
             </a:r>
           </a:p>
         </p:txBody>
@@ -1370,7 +1623,158 @@
     </p:spTree>
     <p:extLst>
       <p:ext uri="{BB962C8B-B14F-4D97-AF65-F5344CB8AC3E}">
-        <p14:creationId xmlns:p14="http://schemas.microsoft.com/office/powerpoint/2010/main" val="2584460063"/>
+        <p14:creationId xmlns:p14="http://schemas.microsoft.com/office/powerpoint/2010/main" val="2600122227"/>
+      </p:ext>
+    </p:extLst>
+  </p:cSld>
+  <p:clrMapOvr>
+    <a:masterClrMapping/>
+  </p:clrMapOvr>
+</p:notes>
+</file>
+
+<file path=ppt/notesSlides/notesSlide9.xml><?xml version="1.0" encoding="utf-8"?>
+<p:notes xmlns:a="http://schemas.openxmlformats.org/drawingml/2006/main" xmlns:r="http://schemas.openxmlformats.org/officeDocument/2006/relationships" xmlns:p="http://schemas.openxmlformats.org/presentationml/2006/main">
+  <p:cSld>
+    <p:spTree>
+      <p:nvGrpSpPr>
+        <p:cNvPr id="1" name=""/>
+        <p:cNvGrpSpPr/>
+        <p:nvPr/>
+      </p:nvGrpSpPr>
+      <p:grpSpPr>
+        <a:xfrm>
+          <a:off x="0" y="0"/>
+          <a:ext cx="0" cy="0"/>
+          <a:chOff x="0" y="0"/>
+          <a:chExt cx="0" cy="0"/>
+        </a:xfrm>
+      </p:grpSpPr>
+      <p:sp>
+        <p:nvSpPr>
+          <p:cNvPr id="2" name="Slide Image Placeholder 1"/>
+          <p:cNvSpPr>
+            <a:spLocks noGrp="1" noRot="1" noChangeAspect="1"/>
+          </p:cNvSpPr>
+          <p:nvPr>
+            <p:ph type="sldImg"/>
+          </p:nvPr>
+        </p:nvSpPr>
+        <p:spPr/>
+      </p:sp>
+      <p:sp>
+        <p:nvSpPr>
+          <p:cNvPr id="3" name="Notes Placeholder 2"/>
+          <p:cNvSpPr>
+            <a:spLocks noGrp="1"/>
+          </p:cNvSpPr>
+          <p:nvPr>
+            <p:ph type="body" idx="1"/>
+          </p:nvPr>
+        </p:nvSpPr>
+        <p:spPr/>
+        <p:txBody>
+          <a:bodyPr/>
+          <a:lstStyle/>
+          <a:p>
+            <a:r>
+              <a:rPr lang="en-AU" dirty="0"/>
+              <a:t>Advanced functional technique: function return values and pattern matching.</a:t>
+            </a:r>
+          </a:p>
+          <a:p>
+            <a:endParaRPr lang="en-AU" dirty="0"/>
+          </a:p>
+          <a:p>
+            <a:r>
+              <a:rPr lang="en-AU" dirty="0"/>
+              <a:t>Uses Python 3.10 pattern patching.</a:t>
+            </a:r>
+          </a:p>
+          <a:p>
+            <a:endParaRPr lang="en-AU" dirty="0"/>
+          </a:p>
+          <a:p>
+            <a:r>
+              <a:rPr lang="en-AU" dirty="0"/>
+              <a:t>Erlang/Elixir use return values for error handling.</a:t>
+            </a:r>
+          </a:p>
+          <a:p>
+            <a:endParaRPr lang="en-AU" dirty="0"/>
+          </a:p>
+          <a:p>
+            <a:r>
+              <a:rPr lang="en-AU" dirty="0"/>
+              <a:t>Very functional, sometimes it’s just nice.</a:t>
+            </a:r>
+            <a:br>
+              <a:rPr lang="en-AU" dirty="0"/>
+            </a:br>
+            <a:r>
+              <a:rPr lang="en-AU" dirty="0"/>
+              <a:t>Explicit control flow.</a:t>
+            </a:r>
+            <a:br>
+              <a:rPr lang="en-AU" dirty="0"/>
+            </a:br>
+            <a:r>
+              <a:rPr lang="en-AU" dirty="0"/>
+              <a:t>More concise code.</a:t>
+            </a:r>
+            <a:br>
+              <a:rPr lang="en-AU" dirty="0"/>
+            </a:br>
+            <a:br>
+              <a:rPr lang="en-AU" dirty="0"/>
+            </a:br>
+            <a:r>
+              <a:rPr lang="en-AU" dirty="0"/>
+              <a:t>Can be statically analysable.</a:t>
+            </a:r>
+          </a:p>
+          <a:p>
+            <a:endParaRPr lang="en-AU" dirty="0"/>
+          </a:p>
+          <a:p>
+            <a:r>
+              <a:rPr lang="en-AU" dirty="0" err="1"/>
+              <a:t>Api_query</a:t>
+            </a:r>
+            <a:r>
+              <a:rPr lang="en-AU" dirty="0"/>
+              <a:t> code example.</a:t>
+            </a:r>
+          </a:p>
+        </p:txBody>
+      </p:sp>
+      <p:sp>
+        <p:nvSpPr>
+          <p:cNvPr id="4" name="Slide Number Placeholder 3"/>
+          <p:cNvSpPr>
+            <a:spLocks noGrp="1"/>
+          </p:cNvSpPr>
+          <p:nvPr>
+            <p:ph type="sldNum" sz="quarter" idx="5"/>
+          </p:nvPr>
+        </p:nvSpPr>
+        <p:spPr/>
+        <p:txBody>
+          <a:bodyPr/>
+          <a:lstStyle/>
+          <a:p>
+            <a:fld id="{0A34E8C3-AF3B-4DB6-BCDD-863FC76CE8C1}" type="slidenum">
+              <a:rPr lang="en-AU" smtClean="0"/>
+              <a:t>10</a:t>
+            </a:fld>
+            <a:endParaRPr lang="en-AU"/>
+          </a:p>
+        </p:txBody>
+      </p:sp>
+    </p:spTree>
+    <p:extLst>
+      <p:ext uri="{BB962C8B-B14F-4D97-AF65-F5344CB8AC3E}">
+        <p14:creationId xmlns:p14="http://schemas.microsoft.com/office/powerpoint/2010/main" val="1434342604"/>
       </p:ext>
     </p:extLst>
   </p:cSld>
@@ -1565,7 +1969,7 @@
           <a:p>
             <a:fld id="{A6AE9103-A54C-4076-A819-AA24BF3DB09C}" type="datetimeFigureOut">
               <a:rPr lang="en-AU" smtClean="0"/>
-              <a:t>21/03/2022</a:t>
+              <a:t>22/03/2022</a:t>
             </a:fld>
             <a:endParaRPr lang="en-AU"/>
           </a:p>
@@ -1863,7 +2267,7 @@
           <a:p>
             <a:fld id="{A6AE9103-A54C-4076-A819-AA24BF3DB09C}" type="datetimeFigureOut">
               <a:rPr lang="en-AU" smtClean="0"/>
-              <a:t>21/03/2022</a:t>
+              <a:t>22/03/2022</a:t>
             </a:fld>
             <a:endParaRPr lang="en-AU"/>
           </a:p>
@@ -2055,7 +2459,7 @@
           <a:p>
             <a:fld id="{A6AE9103-A54C-4076-A819-AA24BF3DB09C}" type="datetimeFigureOut">
               <a:rPr lang="en-AU" smtClean="0"/>
-              <a:t>21/03/2022</a:t>
+              <a:t>22/03/2022</a:t>
             </a:fld>
             <a:endParaRPr lang="en-AU"/>
           </a:p>
@@ -2316,7 +2720,7 @@
           <a:p>
             <a:fld id="{A6AE9103-A54C-4076-A819-AA24BF3DB09C}" type="datetimeFigureOut">
               <a:rPr lang="en-AU" smtClean="0"/>
-              <a:t>21/03/2022</a:t>
+              <a:t>22/03/2022</a:t>
             </a:fld>
             <a:endParaRPr lang="en-AU"/>
           </a:p>
@@ -2740,7 +3144,7 @@
           <a:p>
             <a:fld id="{A6AE9103-A54C-4076-A819-AA24BF3DB09C}" type="datetimeFigureOut">
               <a:rPr lang="en-AU" smtClean="0"/>
-              <a:t>21/03/2022</a:t>
+              <a:t>22/03/2022</a:t>
             </a:fld>
             <a:endParaRPr lang="en-AU"/>
           </a:p>
@@ -3277,7 +3681,7 @@
           <a:p>
             <a:fld id="{A6AE9103-A54C-4076-A819-AA24BF3DB09C}" type="datetimeFigureOut">
               <a:rPr lang="en-AU" smtClean="0"/>
-              <a:t>21/03/2022</a:t>
+              <a:t>22/03/2022</a:t>
             </a:fld>
             <a:endParaRPr lang="en-AU"/>
           </a:p>
@@ -4141,7 +4545,7 @@
           <a:p>
             <a:fld id="{A6AE9103-A54C-4076-A819-AA24BF3DB09C}" type="datetimeFigureOut">
               <a:rPr lang="en-AU" smtClean="0"/>
-              <a:t>21/03/2022</a:t>
+              <a:t>22/03/2022</a:t>
             </a:fld>
             <a:endParaRPr lang="en-AU"/>
           </a:p>
@@ -4311,7 +4715,7 @@
           <a:p>
             <a:fld id="{A6AE9103-A54C-4076-A819-AA24BF3DB09C}" type="datetimeFigureOut">
               <a:rPr lang="en-AU" smtClean="0"/>
-              <a:t>21/03/2022</a:t>
+              <a:t>22/03/2022</a:t>
             </a:fld>
             <a:endParaRPr lang="en-AU"/>
           </a:p>
@@ -4495,7 +4899,7 @@
           <a:p>
             <a:fld id="{A6AE9103-A54C-4076-A819-AA24BF3DB09C}" type="datetimeFigureOut">
               <a:rPr lang="en-AU" smtClean="0"/>
-              <a:t>21/03/2022</a:t>
+              <a:t>22/03/2022</a:t>
             </a:fld>
             <a:endParaRPr lang="en-AU"/>
           </a:p>
@@ -4665,7 +5069,7 @@
           <a:p>
             <a:fld id="{A6AE9103-A54C-4076-A819-AA24BF3DB09C}" type="datetimeFigureOut">
               <a:rPr lang="en-AU" smtClean="0"/>
-              <a:t>21/03/2022</a:t>
+              <a:t>22/03/2022</a:t>
             </a:fld>
             <a:endParaRPr lang="en-AU"/>
           </a:p>
@@ -4909,7 +5313,7 @@
           <a:p>
             <a:fld id="{A6AE9103-A54C-4076-A819-AA24BF3DB09C}" type="datetimeFigureOut">
               <a:rPr lang="en-AU" smtClean="0"/>
-              <a:t>21/03/2022</a:t>
+              <a:t>22/03/2022</a:t>
             </a:fld>
             <a:endParaRPr lang="en-AU"/>
           </a:p>
@@ -5145,7 +5549,7 @@
           <a:p>
             <a:fld id="{A6AE9103-A54C-4076-A819-AA24BF3DB09C}" type="datetimeFigureOut">
               <a:rPr lang="en-AU" smtClean="0"/>
-              <a:t>21/03/2022</a:t>
+              <a:t>22/03/2022</a:t>
             </a:fld>
             <a:endParaRPr lang="en-AU"/>
           </a:p>
@@ -5611,7 +6015,7 @@
           <a:p>
             <a:fld id="{A6AE9103-A54C-4076-A819-AA24BF3DB09C}" type="datetimeFigureOut">
               <a:rPr lang="en-AU" smtClean="0"/>
-              <a:t>21/03/2022</a:t>
+              <a:t>22/03/2022</a:t>
             </a:fld>
             <a:endParaRPr lang="en-AU"/>
           </a:p>
@@ -5729,7 +6133,7 @@
           <a:p>
             <a:fld id="{A6AE9103-A54C-4076-A819-AA24BF3DB09C}" type="datetimeFigureOut">
               <a:rPr lang="en-AU" smtClean="0"/>
-              <a:t>21/03/2022</a:t>
+              <a:t>22/03/2022</a:t>
             </a:fld>
             <a:endParaRPr lang="en-AU"/>
           </a:p>
@@ -5824,7 +6228,7 @@
           <a:p>
             <a:fld id="{A6AE9103-A54C-4076-A819-AA24BF3DB09C}" type="datetimeFigureOut">
               <a:rPr lang="en-AU" smtClean="0"/>
-              <a:t>21/03/2022</a:t>
+              <a:t>22/03/2022</a:t>
             </a:fld>
             <a:endParaRPr lang="en-AU"/>
           </a:p>
@@ -6079,7 +6483,7 @@
           <a:p>
             <a:fld id="{A6AE9103-A54C-4076-A819-AA24BF3DB09C}" type="datetimeFigureOut">
               <a:rPr lang="en-AU" smtClean="0"/>
-              <a:t>21/03/2022</a:t>
+              <a:t>22/03/2022</a:t>
             </a:fld>
             <a:endParaRPr lang="en-AU"/>
           </a:p>
@@ -6379,7 +6783,7 @@
           <a:p>
             <a:fld id="{A6AE9103-A54C-4076-A819-AA24BF3DB09C}" type="datetimeFigureOut">
               <a:rPr lang="en-AU" smtClean="0"/>
-              <a:t>21/03/2022</a:t>
+              <a:t>22/03/2022</a:t>
             </a:fld>
             <a:endParaRPr lang="en-AU"/>
           </a:p>
@@ -6613,7 +7017,7 @@
           <a:p>
             <a:fld id="{A6AE9103-A54C-4076-A819-AA24BF3DB09C}" type="datetimeFigureOut">
               <a:rPr lang="en-AU" smtClean="0"/>
-              <a:t>21/03/2022</a:t>
+              <a:t>22/03/2022</a:t>
             </a:fld>
             <a:endParaRPr lang="en-AU"/>
           </a:p>
@@ -7383,345 +7787,6 @@
           <p:cNvPr id="2" name="Title 1">
             <a:extLst>
               <a:ext uri="{FF2B5EF4-FFF2-40B4-BE49-F238E27FC236}">
-                <a16:creationId xmlns:a16="http://schemas.microsoft.com/office/drawing/2014/main" id="{7D0B687C-4501-4236-BABD-14DB3B2592BD}"/>
-              </a:ext>
-            </a:extLst>
-          </p:cNvPr>
-          <p:cNvSpPr>
-            <a:spLocks noGrp="1"/>
-          </p:cNvSpPr>
-          <p:nvPr>
-            <p:ph type="title"/>
-          </p:nvPr>
-        </p:nvSpPr>
-        <p:spPr/>
-        <p:txBody>
-          <a:bodyPr/>
-          <a:lstStyle/>
-          <a:p>
-            <a:r>
-              <a:rPr lang="en-AU" dirty="0"/>
-              <a:t>Protocols</a:t>
-            </a:r>
-          </a:p>
-        </p:txBody>
-      </p:sp>
-      <p:sp>
-        <p:nvSpPr>
-          <p:cNvPr id="3" name="Content Placeholder 2">
-            <a:extLst>
-              <a:ext uri="{FF2B5EF4-FFF2-40B4-BE49-F238E27FC236}">
-                <a16:creationId xmlns:a16="http://schemas.microsoft.com/office/drawing/2014/main" id="{CF57D465-22F1-4BE5-9E5A-EDAA0D35ED80}"/>
-              </a:ext>
-            </a:extLst>
-          </p:cNvPr>
-          <p:cNvSpPr>
-            <a:spLocks noGrp="1"/>
-          </p:cNvSpPr>
-          <p:nvPr>
-            <p:ph idx="1"/>
-          </p:nvPr>
-        </p:nvSpPr>
-        <p:spPr>
-          <a:xfrm>
-            <a:off x="913795" y="1732449"/>
-            <a:ext cx="10353762" cy="4761869"/>
-          </a:xfrm>
-        </p:spPr>
-        <p:txBody>
-          <a:bodyPr>
-            <a:normAutofit/>
-          </a:bodyPr>
-          <a:lstStyle/>
-          <a:p>
-            <a:pPr>
-              <a:lnSpc>
-                <a:spcPct val="200000"/>
-              </a:lnSpc>
-            </a:pPr>
-            <a:r>
-              <a:rPr lang="en-AU" dirty="0"/>
-              <a:t>Structural subtyping</a:t>
-            </a:r>
-          </a:p>
-          <a:p>
-            <a:pPr>
-              <a:lnSpc>
-                <a:spcPct val="200000"/>
-              </a:lnSpc>
-            </a:pPr>
-            <a:r>
-              <a:rPr lang="en-AU" dirty="0"/>
-              <a:t>Found in </a:t>
-            </a:r>
-            <a:r>
-              <a:rPr lang="en-AU" dirty="0" err="1"/>
-              <a:t>OCaml</a:t>
-            </a:r>
-            <a:r>
-              <a:rPr lang="en-AU" dirty="0"/>
-              <a:t>, Go, C++</a:t>
-            </a:r>
-          </a:p>
-          <a:p>
-            <a:pPr>
-              <a:lnSpc>
-                <a:spcPct val="200000"/>
-              </a:lnSpc>
-            </a:pPr>
-            <a:r>
-              <a:rPr lang="en-AU" dirty="0"/>
-              <a:t>Enable ad-hoc interfaces</a:t>
-            </a:r>
-          </a:p>
-          <a:p>
-            <a:pPr>
-              <a:lnSpc>
-                <a:spcPct val="200000"/>
-              </a:lnSpc>
-            </a:pPr>
-            <a:r>
-              <a:rPr lang="en-AU" dirty="0"/>
-              <a:t>Python standard collections</a:t>
-            </a:r>
-          </a:p>
-          <a:p>
-            <a:pPr>
-              <a:lnSpc>
-                <a:spcPct val="200000"/>
-              </a:lnSpc>
-            </a:pPr>
-            <a:r>
-              <a:rPr lang="en-AU" dirty="0"/>
-              <a:t>Simplify code</a:t>
-            </a:r>
-          </a:p>
-          <a:p>
-            <a:pPr>
-              <a:lnSpc>
-                <a:spcPct val="200000"/>
-              </a:lnSpc>
-            </a:pPr>
-            <a:r>
-              <a:rPr lang="en-AU" dirty="0"/>
-              <a:t>Type safety!</a:t>
-            </a:r>
-          </a:p>
-        </p:txBody>
-      </p:sp>
-      <p:sp>
-        <p:nvSpPr>
-          <p:cNvPr id="4" name="TextBox 3">
-            <a:extLst>
-              <a:ext uri="{FF2B5EF4-FFF2-40B4-BE49-F238E27FC236}">
-                <a16:creationId xmlns:a16="http://schemas.microsoft.com/office/drawing/2014/main" id="{C0A5D94A-62AD-4D35-BC3E-2DBD8DE94B6B}"/>
-              </a:ext>
-            </a:extLst>
-          </p:cNvPr>
-          <p:cNvSpPr txBox="1"/>
-          <p:nvPr/>
-        </p:nvSpPr>
-        <p:spPr>
-          <a:xfrm>
-            <a:off x="10557164" y="1210718"/>
-            <a:ext cx="1634836" cy="369332"/>
-          </a:xfrm>
-          <a:prstGeom prst="rect">
-            <a:avLst/>
-          </a:prstGeom>
-          <a:noFill/>
-        </p:spPr>
-        <p:txBody>
-          <a:bodyPr wrap="square" rtlCol="0">
-            <a:spAutoFit/>
-          </a:bodyPr>
-          <a:lstStyle/>
-          <a:p>
-            <a:r>
-              <a:rPr lang="en-AU" dirty="0"/>
-              <a:t>Python 3.8</a:t>
-            </a:r>
-          </a:p>
-        </p:txBody>
-      </p:sp>
-    </p:spTree>
-    <p:extLst>
-      <p:ext uri="{BB962C8B-B14F-4D97-AF65-F5344CB8AC3E}">
-        <p14:creationId xmlns:p14="http://schemas.microsoft.com/office/powerpoint/2010/main" val="2560508723"/>
-      </p:ext>
-    </p:extLst>
-  </p:cSld>
-  <p:clrMapOvr>
-    <a:masterClrMapping/>
-  </p:clrMapOvr>
-</p:sld>
-</file>
-
-<file path=ppt/slides/slide11.xml><?xml version="1.0" encoding="utf-8"?>
-<p:sld xmlns:a="http://schemas.openxmlformats.org/drawingml/2006/main" xmlns:r="http://schemas.openxmlformats.org/officeDocument/2006/relationships" xmlns:p="http://schemas.openxmlformats.org/presentationml/2006/main">
-  <p:cSld>
-    <p:spTree>
-      <p:nvGrpSpPr>
-        <p:cNvPr id="1" name=""/>
-        <p:cNvGrpSpPr/>
-        <p:nvPr/>
-      </p:nvGrpSpPr>
-      <p:grpSpPr>
-        <a:xfrm>
-          <a:off x="0" y="0"/>
-          <a:ext cx="0" cy="0"/>
-          <a:chOff x="0" y="0"/>
-          <a:chExt cx="0" cy="0"/>
-        </a:xfrm>
-      </p:grpSpPr>
-      <p:sp>
-        <p:nvSpPr>
-          <p:cNvPr id="2" name="Title 1">
-            <a:extLst>
-              <a:ext uri="{FF2B5EF4-FFF2-40B4-BE49-F238E27FC236}">
-                <a16:creationId xmlns:a16="http://schemas.microsoft.com/office/drawing/2014/main" id="{7BA2452B-FC92-4E59-8BDC-A5042372120E}"/>
-              </a:ext>
-            </a:extLst>
-          </p:cNvPr>
-          <p:cNvSpPr>
-            <a:spLocks noGrp="1"/>
-          </p:cNvSpPr>
-          <p:nvPr>
-            <p:ph type="title"/>
-          </p:nvPr>
-        </p:nvSpPr>
-        <p:spPr/>
-        <p:txBody>
-          <a:bodyPr/>
-          <a:lstStyle/>
-          <a:p>
-            <a:r>
-              <a:rPr lang="en-AU" dirty="0"/>
-              <a:t>Context Managers</a:t>
-            </a:r>
-          </a:p>
-        </p:txBody>
-      </p:sp>
-      <p:sp>
-        <p:nvSpPr>
-          <p:cNvPr id="3" name="Content Placeholder 2">
-            <a:extLst>
-              <a:ext uri="{FF2B5EF4-FFF2-40B4-BE49-F238E27FC236}">
-                <a16:creationId xmlns:a16="http://schemas.microsoft.com/office/drawing/2014/main" id="{DC1818CD-50D7-42A8-95BB-4F62B62E24E7}"/>
-              </a:ext>
-            </a:extLst>
-          </p:cNvPr>
-          <p:cNvSpPr>
-            <a:spLocks noGrp="1"/>
-          </p:cNvSpPr>
-          <p:nvPr>
-            <p:ph idx="1"/>
-          </p:nvPr>
-        </p:nvSpPr>
-        <p:spPr>
-          <a:xfrm>
-            <a:off x="913795" y="1732449"/>
-            <a:ext cx="10353762" cy="4179978"/>
-          </a:xfrm>
-        </p:spPr>
-        <p:txBody>
-          <a:bodyPr/>
-          <a:lstStyle/>
-          <a:p>
-            <a:pPr>
-              <a:lnSpc>
-                <a:spcPct val="200000"/>
-              </a:lnSpc>
-            </a:pPr>
-            <a:r>
-              <a:rPr lang="en-AU" dirty="0"/>
-              <a:t>Scoped-based determinism</a:t>
-            </a:r>
-          </a:p>
-          <a:p>
-            <a:pPr>
-              <a:lnSpc>
-                <a:spcPct val="200000"/>
-              </a:lnSpc>
-            </a:pPr>
-            <a:r>
-              <a:rPr lang="en-AU" dirty="0"/>
-              <a:t>Like C++ RAII</a:t>
-            </a:r>
-          </a:p>
-          <a:p>
-            <a:pPr>
-              <a:lnSpc>
-                <a:spcPct val="200000"/>
-              </a:lnSpc>
-            </a:pPr>
-            <a:r>
-              <a:rPr lang="en-AU" dirty="0"/>
-              <a:t>Safe resource management</a:t>
-            </a:r>
-          </a:p>
-          <a:p>
-            <a:pPr>
-              <a:lnSpc>
-                <a:spcPct val="200000"/>
-              </a:lnSpc>
-            </a:pPr>
-            <a:r>
-              <a:rPr lang="en-AU" dirty="0"/>
-              <a:t>Concise code</a:t>
-            </a:r>
-          </a:p>
-          <a:p>
-            <a:pPr>
-              <a:lnSpc>
-                <a:spcPct val="200000"/>
-              </a:lnSpc>
-            </a:pPr>
-            <a:r>
-              <a:rPr lang="en-AU" dirty="0"/>
-              <a:t>More powerful than C++ ?!</a:t>
-            </a:r>
-          </a:p>
-          <a:p>
-            <a:endParaRPr lang="en-AU" dirty="0"/>
-          </a:p>
-        </p:txBody>
-      </p:sp>
-    </p:spTree>
-    <p:extLst>
-      <p:ext uri="{BB962C8B-B14F-4D97-AF65-F5344CB8AC3E}">
-        <p14:creationId xmlns:p14="http://schemas.microsoft.com/office/powerpoint/2010/main" val="1441639075"/>
-      </p:ext>
-    </p:extLst>
-  </p:cSld>
-  <p:clrMapOvr>
-    <a:masterClrMapping/>
-  </p:clrMapOvr>
-</p:sld>
-</file>
-
-<file path=ppt/slides/slide12.xml><?xml version="1.0" encoding="utf-8"?>
-<p:sld xmlns:a="http://schemas.openxmlformats.org/drawingml/2006/main" xmlns:r="http://schemas.openxmlformats.org/officeDocument/2006/relationships" xmlns:p="http://schemas.openxmlformats.org/presentationml/2006/main">
-  <p:cSld>
-    <p:spTree>
-      <p:nvGrpSpPr>
-        <p:cNvPr id="1" name=""/>
-        <p:cNvGrpSpPr/>
-        <p:nvPr/>
-      </p:nvGrpSpPr>
-      <p:grpSpPr>
-        <a:xfrm>
-          <a:off x="0" y="0"/>
-          <a:ext cx="0" cy="0"/>
-          <a:chOff x="0" y="0"/>
-          <a:chExt cx="0" cy="0"/>
-        </a:xfrm>
-      </p:grpSpPr>
-      <p:sp>
-        <p:nvSpPr>
-          <p:cNvPr id="2" name="Title 1">
-            <a:extLst>
-              <a:ext uri="{FF2B5EF4-FFF2-40B4-BE49-F238E27FC236}">
                 <a16:creationId xmlns:a16="http://schemas.microsoft.com/office/drawing/2014/main" id="{29F0341A-4614-4953-9802-AAF0647A6464}"/>
               </a:ext>
             </a:extLst>
@@ -7802,18 +7867,7 @@
             </a:pPr>
             <a:r>
               <a:rPr lang="en-AU" dirty="0"/>
-              <a:t>Very functional</a:t>
-            </a:r>
-          </a:p>
-          <a:p>
-            <a:pPr>
-              <a:lnSpc>
-                <a:spcPct val="200000"/>
-              </a:lnSpc>
-            </a:pPr>
-            <a:r>
-              <a:rPr lang="en-AU" dirty="0"/>
-              <a:t>Explicit code paths</a:t>
+              <a:t>Explicit control flow</a:t>
             </a:r>
           </a:p>
           <a:p>
@@ -7888,7 +7942,7 @@
 </p:sld>
 </file>
 
-<file path=ppt/slides/slide13.xml><?xml version="1.0" encoding="utf-8"?>
+<file path=ppt/slides/slide11.xml><?xml version="1.0" encoding="utf-8"?>
 <p:sld xmlns:a="http://schemas.openxmlformats.org/drawingml/2006/main" xmlns:r="http://schemas.openxmlformats.org/officeDocument/2006/relationships" xmlns:p="http://schemas.openxmlformats.org/presentationml/2006/main">
   <p:cSld>
     <p:spTree>
@@ -8079,20 +8133,6 @@
               <a:t>How can other languages inspire us to make Python more expressive and safer?</a:t>
             </a:r>
           </a:p>
-          <a:p>
-            <a:pPr>
-              <a:lnSpc>
-                <a:spcPct val="200000"/>
-              </a:lnSpc>
-            </a:pPr>
-            <a:r>
-              <a:rPr lang="en-AU" dirty="0"/>
-              <a:t>I’m here to describe, not prescribe</a:t>
-            </a:r>
-          </a:p>
-          <a:p>
-            <a:endParaRPr lang="en-AU" dirty="0"/>
-          </a:p>
         </p:txBody>
       </p:sp>
     </p:spTree>
@@ -8169,9 +8209,16 @@
             <p:ph idx="1"/>
           </p:nvPr>
         </p:nvSpPr>
-        <p:spPr/>
-        <p:txBody>
-          <a:bodyPr/>
+        <p:spPr>
+          <a:xfrm>
+            <a:off x="913795" y="1732449"/>
+            <a:ext cx="10353762" cy="4418969"/>
+          </a:xfrm>
+        </p:spPr>
+        <p:txBody>
+          <a:bodyPr>
+            <a:normAutofit/>
+          </a:bodyPr>
           <a:lstStyle/>
           <a:p>
             <a:pPr>
@@ -8193,6 +8240,17 @@
             <a:r>
               <a:rPr lang="en-AU" dirty="0"/>
               <a:t>Like C, Java, Haskell, Scala, etc.</a:t>
+            </a:r>
+          </a:p>
+          <a:p>
+            <a:pPr>
+              <a:lnSpc>
+                <a:spcPct val="200000"/>
+              </a:lnSpc>
+            </a:pPr>
+            <a:r>
+              <a:rPr lang="en-AU" dirty="0"/>
+              <a:t>Annotate code with “hints” for static analysis</a:t>
             </a:r>
           </a:p>
           <a:p>
@@ -8283,7 +8341,7 @@
           <a:p>
             <a:r>
               <a:rPr lang="en-AU" dirty="0"/>
-              <a:t>Type Hints</a:t>
+              <a:t>Type Hints – New Features</a:t>
             </a:r>
           </a:p>
         </p:txBody>
@@ -8315,9 +8373,18 @@
               </a:lnSpc>
             </a:pPr>
             <a:r>
-              <a:rPr lang="en-AU" dirty="0"/>
-              <a:t>Python is dynamically-typed</a:t>
-            </a:r>
+              <a:rPr lang="en-AU" dirty="0">
+                <a:latin typeface="Consolas" panose="020B0609020204030204" pitchFamily="49" charset="0"/>
+              </a:rPr>
+              <a:t>List[X] -&gt; list[X]      </a:t>
+            </a:r>
+            <a:r>
+              <a:rPr lang="en-AU" dirty="0"/>
+              <a:t>(Python 3.9)</a:t>
+            </a:r>
+            <a:endParaRPr lang="en-AU" dirty="0">
+              <a:latin typeface="Consolas" panose="020B0609020204030204" pitchFamily="49" charset="0"/>
+            </a:endParaRPr>
           </a:p>
           <a:p>
             <a:pPr>
@@ -8326,20 +8393,18 @@
               </a:lnSpc>
             </a:pPr>
             <a:r>
-              <a:rPr lang="en-AU" dirty="0"/>
-              <a:t>Annotate code with “hints” for static analysis</a:t>
-            </a:r>
-          </a:p>
-          <a:p>
-            <a:pPr>
-              <a:lnSpc>
-                <a:spcPct val="200000"/>
-              </a:lnSpc>
-            </a:pPr>
-            <a:r>
-              <a:rPr lang="en-AU" dirty="0"/>
-              <a:t>Unused at runtime</a:t>
-            </a:r>
+              <a:rPr lang="en-AU" dirty="0">
+                <a:latin typeface="Consolas" panose="020B0609020204030204" pitchFamily="49" charset="0"/>
+              </a:rPr>
+              <a:t>Union[X, Y] -&gt; X | Y    </a:t>
+            </a:r>
+            <a:r>
+              <a:rPr lang="en-AU" dirty="0"/>
+              <a:t>(Python 3.10)</a:t>
+            </a:r>
+            <a:endParaRPr lang="en-AU" dirty="0">
+              <a:latin typeface="Consolas" panose="020B0609020204030204" pitchFamily="49" charset="0"/>
+            </a:endParaRPr>
           </a:p>
         </p:txBody>
       </p:sp>
@@ -8378,7 +8443,7 @@
           <p:cNvPr id="2" name="Title 1">
             <a:extLst>
               <a:ext uri="{FF2B5EF4-FFF2-40B4-BE49-F238E27FC236}">
-                <a16:creationId xmlns:a16="http://schemas.microsoft.com/office/drawing/2014/main" id="{618136B8-A10D-4286-AC12-FB4AC769C09E}"/>
+                <a16:creationId xmlns:a16="http://schemas.microsoft.com/office/drawing/2014/main" id="{FDD1E7DE-1426-4028-958B-5ABF480F0519}"/>
               </a:ext>
             </a:extLst>
           </p:cNvPr>
@@ -8395,10 +8460,9 @@
           <a:lstStyle/>
           <a:p>
             <a:r>
-              <a:rPr lang="en-AU" dirty="0" err="1"/>
-              <a:t>Dataclasses</a:t>
-            </a:r>
-            <a:endParaRPr lang="en-AU" dirty="0"/>
+              <a:rPr lang="en-AU" dirty="0"/>
+              <a:t>Type Parameters</a:t>
+            </a:r>
           </a:p>
         </p:txBody>
       </p:sp>
@@ -8407,7 +8471,7 @@
           <p:cNvPr id="3" name="Content Placeholder 2">
             <a:extLst>
               <a:ext uri="{FF2B5EF4-FFF2-40B4-BE49-F238E27FC236}">
-                <a16:creationId xmlns:a16="http://schemas.microsoft.com/office/drawing/2014/main" id="{B122BE4C-3CC3-4CC3-BCC7-A389DC2944A5}"/>
+                <a16:creationId xmlns:a16="http://schemas.microsoft.com/office/drawing/2014/main" id="{43AC7480-276B-4E00-A260-75ABB9D4954C}"/>
               </a:ext>
             </a:extLst>
           </p:cNvPr>
@@ -8418,16 +8482,9 @@
             <p:ph idx="1"/>
           </p:nvPr>
         </p:nvSpPr>
-        <p:spPr>
-          <a:xfrm>
-            <a:off x="913795" y="1732449"/>
-            <a:ext cx="10353762" cy="4709915"/>
-          </a:xfrm>
-        </p:spPr>
-        <p:txBody>
-          <a:bodyPr>
-            <a:normAutofit/>
-          </a:bodyPr>
+        <p:spPr/>
+        <p:txBody>
+          <a:bodyPr/>
           <a:lstStyle/>
           <a:p>
             <a:pPr>
@@ -8437,7 +8494,7 @@
             </a:pPr>
             <a:r>
               <a:rPr lang="en-AU" dirty="0"/>
-              <a:t>Struct, record, plain-old-data (POD) types</a:t>
+              <a:t>Parameterise things on types</a:t>
             </a:r>
           </a:p>
           <a:p>
@@ -8448,7 +8505,7 @@
             </a:pPr>
             <a:r>
               <a:rPr lang="en-AU" dirty="0"/>
-              <a:t>“Classes” with just data</a:t>
+              <a:t>Java and C# generics, C++ templates</a:t>
             </a:r>
           </a:p>
           <a:p>
@@ -8459,51 +8516,15 @@
             </a:pPr>
             <a:r>
               <a:rPr lang="en-AU" dirty="0"/>
-              <a:t>Found in many functional languages, also C, C#, Kotlin</a:t>
-            </a:r>
-          </a:p>
-          <a:p>
-            <a:pPr>
-              <a:lnSpc>
-                <a:spcPct val="200000"/>
-              </a:lnSpc>
-            </a:pPr>
-            <a:r>
-              <a:rPr lang="en-AU" dirty="0"/>
-              <a:t>Python often uses a functional style</a:t>
-            </a:r>
-          </a:p>
-          <a:p>
-            <a:pPr>
-              <a:lnSpc>
-                <a:spcPct val="200000"/>
-              </a:lnSpc>
-            </a:pPr>
-            <a:r>
-              <a:rPr lang="en-AU" dirty="0"/>
-              <a:t>Simple, concise code</a:t>
-            </a:r>
-          </a:p>
-          <a:p>
-            <a:pPr>
-              <a:lnSpc>
-                <a:spcPct val="200000"/>
-              </a:lnSpc>
-            </a:pPr>
-            <a:r>
-              <a:rPr lang="en-AU" dirty="0"/>
-              <a:t>Immutability = win</a:t>
-            </a:r>
-          </a:p>
-          <a:p>
-            <a:endParaRPr lang="en-AU" dirty="0"/>
+              <a:t>Static analysis for polymorphism</a:t>
+            </a:r>
           </a:p>
         </p:txBody>
       </p:sp>
     </p:spTree>
     <p:extLst>
       <p:ext uri="{BB962C8B-B14F-4D97-AF65-F5344CB8AC3E}">
-        <p14:creationId xmlns:p14="http://schemas.microsoft.com/office/powerpoint/2010/main" val="1036817566"/>
+        <p14:creationId xmlns:p14="http://schemas.microsoft.com/office/powerpoint/2010/main" val="1902738952"/>
       </p:ext>
     </p:extLst>
   </p:cSld>
@@ -8535,7 +8556,7 @@
           <p:cNvPr id="2" name="Title 1">
             <a:extLst>
               <a:ext uri="{FF2B5EF4-FFF2-40B4-BE49-F238E27FC236}">
-                <a16:creationId xmlns:a16="http://schemas.microsoft.com/office/drawing/2014/main" id="{FDD1E7DE-1426-4028-958B-5ABF480F0519}"/>
+                <a16:creationId xmlns:a16="http://schemas.microsoft.com/office/drawing/2014/main" id="{1B48DDB7-76F9-479B-94FF-81E5FA4B7981}"/>
               </a:ext>
             </a:extLst>
           </p:cNvPr>
@@ -8553,7 +8574,7 @@
           <a:p>
             <a:r>
               <a:rPr lang="en-AU" dirty="0"/>
-              <a:t>Type Parameters</a:t>
+              <a:t>Parameter Specifications</a:t>
             </a:r>
           </a:p>
         </p:txBody>
@@ -8563,7 +8584,7 @@
           <p:cNvPr id="3" name="Content Placeholder 2">
             <a:extLst>
               <a:ext uri="{FF2B5EF4-FFF2-40B4-BE49-F238E27FC236}">
-                <a16:creationId xmlns:a16="http://schemas.microsoft.com/office/drawing/2014/main" id="{43AC7480-276B-4E00-A260-75ABB9D4954C}"/>
+                <a16:creationId xmlns:a16="http://schemas.microsoft.com/office/drawing/2014/main" id="{4E170548-ACA5-43CA-8805-AD0DE9DA9BC8}"/>
               </a:ext>
             </a:extLst>
           </p:cNvPr>
@@ -8586,7 +8607,7 @@
             </a:pPr>
             <a:r>
               <a:rPr lang="en-AU" dirty="0"/>
-              <a:t>Parameterise things on types</a:t>
+              <a:t>Static typing for handling arbitrary functions</a:t>
             </a:r>
           </a:p>
           <a:p>
@@ -8597,7 +8618,7 @@
             </a:pPr>
             <a:r>
               <a:rPr lang="en-AU" dirty="0"/>
-              <a:t>Java and C# generics, C++ templates</a:t>
+              <a:t>Like C++ variadic templates</a:t>
             </a:r>
           </a:p>
           <a:p>
@@ -8608,7 +8629,42 @@
             </a:pPr>
             <a:r>
               <a:rPr lang="en-AU" dirty="0"/>
-              <a:t>Type safe!</a:t>
+              <a:t>Static analysis for function wrappers</a:t>
+            </a:r>
+          </a:p>
+        </p:txBody>
+      </p:sp>
+      <p:sp>
+        <p:nvSpPr>
+          <p:cNvPr id="4" name="TextBox 3">
+            <a:extLst>
+              <a:ext uri="{FF2B5EF4-FFF2-40B4-BE49-F238E27FC236}">
+                <a16:creationId xmlns:a16="http://schemas.microsoft.com/office/drawing/2014/main" id="{CDB34E49-F1CF-4DDF-BA62-8F43DFCB3220}"/>
+              </a:ext>
+            </a:extLst>
+          </p:cNvPr>
+          <p:cNvSpPr txBox="1"/>
+          <p:nvPr/>
+        </p:nvSpPr>
+        <p:spPr>
+          <a:xfrm>
+            <a:off x="10557164" y="1210718"/>
+            <a:ext cx="1634836" cy="369332"/>
+          </a:xfrm>
+          <a:prstGeom prst="rect">
+            <a:avLst/>
+          </a:prstGeom>
+          <a:noFill/>
+        </p:spPr>
+        <p:txBody>
+          <a:bodyPr wrap="square" rtlCol="0">
+            <a:spAutoFit/>
+          </a:bodyPr>
+          <a:lstStyle/>
+          <a:p>
+            <a:r>
+              <a:rPr lang="en-AU" dirty="0"/>
+              <a:t>Python 3.10</a:t>
             </a:r>
           </a:p>
         </p:txBody>
@@ -8616,7 +8672,7 @@
     </p:spTree>
     <p:extLst>
       <p:ext uri="{BB962C8B-B14F-4D97-AF65-F5344CB8AC3E}">
-        <p14:creationId xmlns:p14="http://schemas.microsoft.com/office/powerpoint/2010/main" val="1902738952"/>
+        <p14:creationId xmlns:p14="http://schemas.microsoft.com/office/powerpoint/2010/main" val="4141789721"/>
       </p:ext>
     </p:extLst>
   </p:cSld>
@@ -8648,7 +8704,7 @@
           <p:cNvPr id="2" name="Title 1">
             <a:extLst>
               <a:ext uri="{FF2B5EF4-FFF2-40B4-BE49-F238E27FC236}">
-                <a16:creationId xmlns:a16="http://schemas.microsoft.com/office/drawing/2014/main" id="{1B48DDB7-76F9-479B-94FF-81E5FA4B7981}"/>
+                <a16:creationId xmlns:a16="http://schemas.microsoft.com/office/drawing/2014/main" id="{618136B8-A10D-4286-AC12-FB4AC769C09E}"/>
               </a:ext>
             </a:extLst>
           </p:cNvPr>
@@ -8665,9 +8721,10 @@
           <a:lstStyle/>
           <a:p>
             <a:r>
-              <a:rPr lang="en-AU" dirty="0"/>
-              <a:t>Parameter Specifications</a:t>
-            </a:r>
+              <a:rPr lang="en-AU" dirty="0" err="1"/>
+              <a:t>Dataclasses</a:t>
+            </a:r>
+            <a:endParaRPr lang="en-AU" dirty="0"/>
           </a:p>
         </p:txBody>
       </p:sp>
@@ -8676,7 +8733,7 @@
           <p:cNvPr id="3" name="Content Placeholder 2">
             <a:extLst>
               <a:ext uri="{FF2B5EF4-FFF2-40B4-BE49-F238E27FC236}">
-                <a16:creationId xmlns:a16="http://schemas.microsoft.com/office/drawing/2014/main" id="{4E170548-ACA5-43CA-8805-AD0DE9DA9BC8}"/>
+                <a16:creationId xmlns:a16="http://schemas.microsoft.com/office/drawing/2014/main" id="{B122BE4C-3CC3-4CC3-BCC7-A389DC2944A5}"/>
               </a:ext>
             </a:extLst>
           </p:cNvPr>
@@ -8687,9 +8744,16 @@
             <p:ph idx="1"/>
           </p:nvPr>
         </p:nvSpPr>
-        <p:spPr/>
-        <p:txBody>
-          <a:bodyPr/>
+        <p:spPr>
+          <a:xfrm>
+            <a:off x="913795" y="1732449"/>
+            <a:ext cx="10353762" cy="4709915"/>
+          </a:xfrm>
+        </p:spPr>
+        <p:txBody>
+          <a:bodyPr>
+            <a:normAutofit/>
+          </a:bodyPr>
           <a:lstStyle/>
           <a:p>
             <a:pPr>
@@ -8699,7 +8763,7 @@
             </a:pPr>
             <a:r>
               <a:rPr lang="en-AU" dirty="0"/>
-              <a:t>Static typing for handling arbitrary functions</a:t>
+              <a:t>Struct, record, plain-old-data (POD) types</a:t>
             </a:r>
           </a:p>
           <a:p>
@@ -8710,7 +8774,7 @@
             </a:pPr>
             <a:r>
               <a:rPr lang="en-AU" dirty="0"/>
-              <a:t>Like C++ variadic templates</a:t>
+              <a:t>“Classes” with just data</a:t>
             </a:r>
           </a:p>
           <a:p>
@@ -8721,7 +8785,40 @@
             </a:pPr>
             <a:r>
               <a:rPr lang="en-AU" dirty="0"/>
-              <a:t>Can now wrap functions type-safely</a:t>
+              <a:t>Found in many functional languages, also C, C#, Kotlin</a:t>
+            </a:r>
+          </a:p>
+          <a:p>
+            <a:pPr>
+              <a:lnSpc>
+                <a:spcPct val="200000"/>
+              </a:lnSpc>
+            </a:pPr>
+            <a:r>
+              <a:rPr lang="en-AU" dirty="0"/>
+              <a:t>Python often uses a functional style</a:t>
+            </a:r>
+          </a:p>
+          <a:p>
+            <a:pPr>
+              <a:lnSpc>
+                <a:spcPct val="200000"/>
+              </a:lnSpc>
+            </a:pPr>
+            <a:r>
+              <a:rPr lang="en-AU" dirty="0"/>
+              <a:t>Immutability = win</a:t>
+            </a:r>
+          </a:p>
+          <a:p>
+            <a:pPr>
+              <a:lnSpc>
+                <a:spcPct val="200000"/>
+              </a:lnSpc>
+            </a:pPr>
+            <a:r>
+              <a:rPr lang="en-AU" dirty="0"/>
+              <a:t>Simple, concise code</a:t>
             </a:r>
           </a:p>
         </p:txBody>
@@ -8731,7 +8828,7 @@
           <p:cNvPr id="4" name="TextBox 3">
             <a:extLst>
               <a:ext uri="{FF2B5EF4-FFF2-40B4-BE49-F238E27FC236}">
-                <a16:creationId xmlns:a16="http://schemas.microsoft.com/office/drawing/2014/main" id="{CDB34E49-F1CF-4DDF-BA62-8F43DFCB3220}"/>
+                <a16:creationId xmlns:a16="http://schemas.microsoft.com/office/drawing/2014/main" id="{C32F95DC-3AEC-441A-A6D1-A9E6F97841A7}"/>
               </a:ext>
             </a:extLst>
           </p:cNvPr>
@@ -8756,7 +8853,7 @@
           <a:p>
             <a:r>
               <a:rPr lang="en-AU" dirty="0"/>
-              <a:t>Python 3.10</a:t>
+              <a:t>Python 3.7</a:t>
             </a:r>
           </a:p>
         </p:txBody>
@@ -8764,7 +8861,7 @@
     </p:spTree>
     <p:extLst>
       <p:ext uri="{BB962C8B-B14F-4D97-AF65-F5344CB8AC3E}">
-        <p14:creationId xmlns:p14="http://schemas.microsoft.com/office/powerpoint/2010/main" val="4141789721"/>
+        <p14:creationId xmlns:p14="http://schemas.microsoft.com/office/powerpoint/2010/main" val="1036817566"/>
       </p:ext>
     </p:extLst>
   </p:cSld>
@@ -8796,7 +8893,7 @@
           <p:cNvPr id="2" name="Title 1">
             <a:extLst>
               <a:ext uri="{FF2B5EF4-FFF2-40B4-BE49-F238E27FC236}">
-                <a16:creationId xmlns:a16="http://schemas.microsoft.com/office/drawing/2014/main" id="{A61B4F3F-497A-4D68-88DF-B938D4FAAEB7}"/>
+                <a16:creationId xmlns:a16="http://schemas.microsoft.com/office/drawing/2014/main" id="{441574C0-A859-4BBE-8C62-78ED934D2D0F}"/>
               </a:ext>
             </a:extLst>
           </p:cNvPr>
@@ -8814,7 +8911,7 @@
           <a:p>
             <a:r>
               <a:rPr lang="en-AU" dirty="0"/>
-              <a:t>Type Parameter Bounds</a:t>
+              <a:t>Deduced Self Type</a:t>
             </a:r>
           </a:p>
         </p:txBody>
@@ -8824,7 +8921,7 @@
           <p:cNvPr id="3" name="Content Placeholder 2">
             <a:extLst>
               <a:ext uri="{FF2B5EF4-FFF2-40B4-BE49-F238E27FC236}">
-                <a16:creationId xmlns:a16="http://schemas.microsoft.com/office/drawing/2014/main" id="{D8264B0E-B6E5-4CF2-9ECA-707C0A66C668}"/>
+                <a16:creationId xmlns:a16="http://schemas.microsoft.com/office/drawing/2014/main" id="{1F4AD51F-DC36-4DC6-9450-DFD3CE450BD6}"/>
               </a:ext>
             </a:extLst>
           </p:cNvPr>
@@ -8835,9 +8932,16 @@
             <p:ph idx="1"/>
           </p:nvPr>
         </p:nvSpPr>
-        <p:spPr/>
-        <p:txBody>
-          <a:bodyPr/>
+        <p:spPr>
+          <a:xfrm>
+            <a:off x="913795" y="1732449"/>
+            <a:ext cx="10353762" cy="4626787"/>
+          </a:xfrm>
+        </p:spPr>
+        <p:txBody>
+          <a:bodyPr>
+            <a:normAutofit/>
+          </a:bodyPr>
           <a:lstStyle/>
           <a:p>
             <a:pPr>
@@ -8847,40 +8951,75 @@
             </a:pPr>
             <a:r>
               <a:rPr lang="en-AU" dirty="0"/>
-              <a:t>Constraints for type parameters</a:t>
-            </a:r>
-          </a:p>
-          <a:p>
-            <a:pPr algn="just">
+              <a:t>Capturing derived type in base class</a:t>
+            </a:r>
+          </a:p>
+          <a:p>
+            <a:pPr>
               <a:lnSpc>
                 <a:spcPct val="200000"/>
               </a:lnSpc>
             </a:pPr>
             <a:r>
               <a:rPr lang="en-AU" dirty="0"/>
-              <a:t>Like Java and C# generics constraints</a:t>
-            </a:r>
-          </a:p>
-          <a:p>
-            <a:pPr algn="just">
+              <a:t>Ultra cool feature</a:t>
+            </a:r>
+          </a:p>
+          <a:p>
+            <a:pPr>
               <a:lnSpc>
                 <a:spcPct val="200000"/>
               </a:lnSpc>
             </a:pPr>
             <a:r>
               <a:rPr lang="en-AU" dirty="0"/>
-              <a:t>Express intent</a:t>
-            </a:r>
-          </a:p>
-          <a:p>
-            <a:pPr algn="just">
+              <a:t>Built-in support in Scala, </a:t>
+            </a:r>
+            <a:r>
+              <a:rPr lang="en-AU" dirty="0" err="1"/>
+              <a:t>OCaml</a:t>
+            </a:r>
+            <a:r>
+              <a:rPr lang="en-AU" dirty="0"/>
+              <a:t>, Rust, C++23, Python 3.11</a:t>
+            </a:r>
+          </a:p>
+          <a:p>
+            <a:pPr>
               <a:lnSpc>
                 <a:spcPct val="200000"/>
               </a:lnSpc>
             </a:pPr>
             <a:r>
               <a:rPr lang="en-AU" dirty="0"/>
-              <a:t>Stricter static analysis</a:t>
+              <a:t>Manual support in Python &lt; 3.11</a:t>
+            </a:r>
+          </a:p>
+          <a:p>
+            <a:pPr>
+              <a:lnSpc>
+                <a:spcPct val="200000"/>
+              </a:lnSpc>
+            </a:pPr>
+            <a:r>
+              <a:rPr lang="en-AU" dirty="0"/>
+              <a:t>Enable expressive </a:t>
+            </a:r>
+            <a:r>
+              <a:rPr lang="en-AU" dirty="0" err="1"/>
+              <a:t>mixins</a:t>
+            </a:r>
+            <a:endParaRPr lang="en-AU" dirty="0"/>
+          </a:p>
+          <a:p>
+            <a:pPr>
+              <a:lnSpc>
+                <a:spcPct val="200000"/>
+              </a:lnSpc>
+            </a:pPr>
+            <a:r>
+              <a:rPr lang="en-AU" dirty="0"/>
+              <a:t>Statically analysable</a:t>
             </a:r>
           </a:p>
         </p:txBody>
@@ -8888,7 +9027,7 @@
     </p:spTree>
     <p:extLst>
       <p:ext uri="{BB962C8B-B14F-4D97-AF65-F5344CB8AC3E}">
-        <p14:creationId xmlns:p14="http://schemas.microsoft.com/office/powerpoint/2010/main" val="1277330571"/>
+        <p14:creationId xmlns:p14="http://schemas.microsoft.com/office/powerpoint/2010/main" val="1394642750"/>
       </p:ext>
     </p:extLst>
   </p:cSld>
@@ -8920,7 +9059,7 @@
           <p:cNvPr id="2" name="Title 1">
             <a:extLst>
               <a:ext uri="{FF2B5EF4-FFF2-40B4-BE49-F238E27FC236}">
-                <a16:creationId xmlns:a16="http://schemas.microsoft.com/office/drawing/2014/main" id="{441574C0-A859-4BBE-8C62-78ED934D2D0F}"/>
+                <a16:creationId xmlns:a16="http://schemas.microsoft.com/office/drawing/2014/main" id="{7D0B687C-4501-4236-BABD-14DB3B2592BD}"/>
               </a:ext>
             </a:extLst>
           </p:cNvPr>
@@ -8938,7 +9077,7 @@
           <a:p>
             <a:r>
               <a:rPr lang="en-AU" dirty="0"/>
-              <a:t>Deduced Self Type</a:t>
+              <a:t>Protocols</a:t>
             </a:r>
           </a:p>
         </p:txBody>
@@ -8948,7 +9087,7 @@
           <p:cNvPr id="3" name="Content Placeholder 2">
             <a:extLst>
               <a:ext uri="{FF2B5EF4-FFF2-40B4-BE49-F238E27FC236}">
-                <a16:creationId xmlns:a16="http://schemas.microsoft.com/office/drawing/2014/main" id="{1F4AD51F-DC36-4DC6-9450-DFD3CE450BD6}"/>
+                <a16:creationId xmlns:a16="http://schemas.microsoft.com/office/drawing/2014/main" id="{CF57D465-22F1-4BE5-9E5A-EDAA0D35ED80}"/>
               </a:ext>
             </a:extLst>
           </p:cNvPr>
@@ -8962,7 +9101,7 @@
         <p:spPr>
           <a:xfrm>
             <a:off x="913795" y="1732449"/>
-            <a:ext cx="10353762" cy="4626787"/>
+            <a:ext cx="10353762" cy="4761869"/>
           </a:xfrm>
         </p:spPr>
         <p:txBody>
@@ -8978,7 +9117,7 @@
             </a:pPr>
             <a:r>
               <a:rPr lang="en-AU" dirty="0"/>
-              <a:t>Capturing derived type in base class</a:t>
+              <a:t>Structural subtyping</a:t>
             </a:r>
           </a:p>
           <a:p>
@@ -8989,7 +9128,15 @@
             </a:pPr>
             <a:r>
               <a:rPr lang="en-AU" dirty="0"/>
-              <a:t>Ultra cool feature</a:t>
+              <a:t>Found in </a:t>
+            </a:r>
+            <a:r>
+              <a:rPr lang="en-AU" dirty="0" err="1"/>
+              <a:t>OCaml</a:t>
+            </a:r>
+            <a:r>
+              <a:rPr lang="en-AU" dirty="0"/>
+              <a:t>, Go, C++</a:t>
             </a:r>
           </a:p>
           <a:p>
@@ -9000,15 +9147,7 @@
             </a:pPr>
             <a:r>
               <a:rPr lang="en-AU" dirty="0"/>
-              <a:t>Built-in support in Scala, </a:t>
-            </a:r>
-            <a:r>
-              <a:rPr lang="en-AU" dirty="0" err="1"/>
-              <a:t>OCaml</a:t>
-            </a:r>
-            <a:r>
-              <a:rPr lang="en-AU" dirty="0"/>
-              <a:t>, Rust, C++23, Python 3.11</a:t>
+              <a:t>Enables ad-hoc interface implementation</a:t>
             </a:r>
           </a:p>
           <a:p>
@@ -9019,7 +9158,7 @@
             </a:pPr>
             <a:r>
               <a:rPr lang="en-AU" dirty="0"/>
-              <a:t>Manual support in C++ &lt; 23 and Python &lt; 3.11</a:t>
+              <a:t>Python standard collections</a:t>
             </a:r>
           </a:p>
           <a:p>
@@ -9030,13 +9169,8 @@
             </a:pPr>
             <a:r>
               <a:rPr lang="en-AU" dirty="0"/>
-              <a:t>Enable expressive </a:t>
-            </a:r>
-            <a:r>
-              <a:rPr lang="en-AU" dirty="0" err="1"/>
-              <a:t>mixins</a:t>
-            </a:r>
-            <a:endParaRPr lang="en-AU" dirty="0"/>
+              <a:t>Simplify code</a:t>
+            </a:r>
           </a:p>
           <a:p>
             <a:pPr>
@@ -9046,7 +9180,42 @@
             </a:pPr>
             <a:r>
               <a:rPr lang="en-AU" dirty="0"/>
-              <a:t>Type safety!</a:t>
+              <a:t>Statically analysable</a:t>
+            </a:r>
+          </a:p>
+        </p:txBody>
+      </p:sp>
+      <p:sp>
+        <p:nvSpPr>
+          <p:cNvPr id="4" name="TextBox 3">
+            <a:extLst>
+              <a:ext uri="{FF2B5EF4-FFF2-40B4-BE49-F238E27FC236}">
+                <a16:creationId xmlns:a16="http://schemas.microsoft.com/office/drawing/2014/main" id="{C0A5D94A-62AD-4D35-BC3E-2DBD8DE94B6B}"/>
+              </a:ext>
+            </a:extLst>
+          </p:cNvPr>
+          <p:cNvSpPr txBox="1"/>
+          <p:nvPr/>
+        </p:nvSpPr>
+        <p:spPr>
+          <a:xfrm>
+            <a:off x="10557164" y="1210718"/>
+            <a:ext cx="1634836" cy="369332"/>
+          </a:xfrm>
+          <a:prstGeom prst="rect">
+            <a:avLst/>
+          </a:prstGeom>
+          <a:noFill/>
+        </p:spPr>
+        <p:txBody>
+          <a:bodyPr wrap="square" rtlCol="0">
+            <a:spAutoFit/>
+          </a:bodyPr>
+          <a:lstStyle/>
+          <a:p>
+            <a:r>
+              <a:rPr lang="en-AU" dirty="0"/>
+              <a:t>Python 3.8</a:t>
             </a:r>
           </a:p>
         </p:txBody>
@@ -9054,7 +9223,7 @@
     </p:spTree>
     <p:extLst>
       <p:ext uri="{BB962C8B-B14F-4D97-AF65-F5344CB8AC3E}">
-        <p14:creationId xmlns:p14="http://schemas.microsoft.com/office/powerpoint/2010/main" val="1394642750"/>
+        <p14:creationId xmlns:p14="http://schemas.microsoft.com/office/powerpoint/2010/main" val="2560508723"/>
       </p:ext>
     </p:extLst>
   </p:cSld>

</xml_diff>